<commit_message>
first view for web. first template and css file
</commit_message>
<xml_diff>
--- a/presentation/protection.pptx
+++ b/presentation/protection.pptx
@@ -322,7 +322,7 @@
           <a:p>
             <a:fld id="{6ACA84D5-F057-41B3-A8BB-3A0B2F025350}" type="datetimeFigureOut">
               <a:rPr lang="ru-RU" smtClean="0"/>
-              <a:t>18.04.2024</a:t>
+              <a:t>27.04.2024</a:t>
             </a:fld>
             <a:endParaRPr lang="ru-RU"/>
           </a:p>
@@ -520,7 +520,7 @@
           <a:p>
             <a:fld id="{6ACA84D5-F057-41B3-A8BB-3A0B2F025350}" type="datetimeFigureOut">
               <a:rPr lang="ru-RU" smtClean="0"/>
-              <a:t>18.04.2024</a:t>
+              <a:t>27.04.2024</a:t>
             </a:fld>
             <a:endParaRPr lang="ru-RU"/>
           </a:p>
@@ -728,7 +728,7 @@
           <a:p>
             <a:fld id="{6ACA84D5-F057-41B3-A8BB-3A0B2F025350}" type="datetimeFigureOut">
               <a:rPr lang="ru-RU" smtClean="0"/>
-              <a:t>18.04.2024</a:t>
+              <a:t>27.04.2024</a:t>
             </a:fld>
             <a:endParaRPr lang="ru-RU"/>
           </a:p>
@@ -926,7 +926,7 @@
           <a:p>
             <a:fld id="{6ACA84D5-F057-41B3-A8BB-3A0B2F025350}" type="datetimeFigureOut">
               <a:rPr lang="ru-RU" smtClean="0"/>
-              <a:t>18.04.2024</a:t>
+              <a:t>27.04.2024</a:t>
             </a:fld>
             <a:endParaRPr lang="ru-RU"/>
           </a:p>
@@ -1201,7 +1201,7 @@
           <a:p>
             <a:fld id="{6ACA84D5-F057-41B3-A8BB-3A0B2F025350}" type="datetimeFigureOut">
               <a:rPr lang="ru-RU" smtClean="0"/>
-              <a:t>18.04.2024</a:t>
+              <a:t>27.04.2024</a:t>
             </a:fld>
             <a:endParaRPr lang="ru-RU"/>
           </a:p>
@@ -1466,7 +1466,7 @@
           <a:p>
             <a:fld id="{6ACA84D5-F057-41B3-A8BB-3A0B2F025350}" type="datetimeFigureOut">
               <a:rPr lang="ru-RU" smtClean="0"/>
-              <a:t>18.04.2024</a:t>
+              <a:t>27.04.2024</a:t>
             </a:fld>
             <a:endParaRPr lang="ru-RU"/>
           </a:p>
@@ -1878,7 +1878,7 @@
           <a:p>
             <a:fld id="{6ACA84D5-F057-41B3-A8BB-3A0B2F025350}" type="datetimeFigureOut">
               <a:rPr lang="ru-RU" smtClean="0"/>
-              <a:t>18.04.2024</a:t>
+              <a:t>27.04.2024</a:t>
             </a:fld>
             <a:endParaRPr lang="ru-RU"/>
           </a:p>
@@ -2019,7 +2019,7 @@
           <a:p>
             <a:fld id="{6ACA84D5-F057-41B3-A8BB-3A0B2F025350}" type="datetimeFigureOut">
               <a:rPr lang="ru-RU" smtClean="0"/>
-              <a:t>18.04.2024</a:t>
+              <a:t>27.04.2024</a:t>
             </a:fld>
             <a:endParaRPr lang="ru-RU"/>
           </a:p>
@@ -2132,7 +2132,7 @@
           <a:p>
             <a:fld id="{6ACA84D5-F057-41B3-A8BB-3A0B2F025350}" type="datetimeFigureOut">
               <a:rPr lang="ru-RU" smtClean="0"/>
-              <a:t>18.04.2024</a:t>
+              <a:t>27.04.2024</a:t>
             </a:fld>
             <a:endParaRPr lang="ru-RU"/>
           </a:p>
@@ -2443,7 +2443,7 @@
           <a:p>
             <a:fld id="{6ACA84D5-F057-41B3-A8BB-3A0B2F025350}" type="datetimeFigureOut">
               <a:rPr lang="ru-RU" smtClean="0"/>
-              <a:t>18.04.2024</a:t>
+              <a:t>27.04.2024</a:t>
             </a:fld>
             <a:endParaRPr lang="ru-RU"/>
           </a:p>
@@ -2731,7 +2731,7 @@
           <a:p>
             <a:fld id="{6ACA84D5-F057-41B3-A8BB-3A0B2F025350}" type="datetimeFigureOut">
               <a:rPr lang="ru-RU" smtClean="0"/>
-              <a:t>18.04.2024</a:t>
+              <a:t>27.04.2024</a:t>
             </a:fld>
             <a:endParaRPr lang="ru-RU"/>
           </a:p>
@@ -2975,7 +2975,7 @@
           <a:p>
             <a:fld id="{6ACA84D5-F057-41B3-A8BB-3A0B2F025350}" type="datetimeFigureOut">
               <a:rPr lang="ru-RU" smtClean="0"/>
-              <a:t>18.04.2024</a:t>
+              <a:t>27.04.2024</a:t>
             </a:fld>
             <a:endParaRPr lang="ru-RU"/>
           </a:p>
@@ -6276,42 +6276,6 @@
           </a:p>
         </p:txBody>
       </p:sp>
-      <p:pic>
-        <p:nvPicPr>
-          <p:cNvPr id="6" name="Рисунок 5" descr="Изображение выглядит как снимок экрана, шаблон, круг, Графика&#10;&#10;Автоматически созданное описание">
-            <a:extLst>
-              <a:ext uri="{FF2B5EF4-FFF2-40B4-BE49-F238E27FC236}">
-                <a16:creationId xmlns:a16="http://schemas.microsoft.com/office/drawing/2014/main" id="{ED4B8FAA-8314-DE31-F8B1-7B92499B9B11}"/>
-              </a:ext>
-            </a:extLst>
-          </p:cNvPr>
-          <p:cNvPicPr>
-            <a:picLocks noChangeAspect="1"/>
-          </p:cNvPicPr>
-          <p:nvPr/>
-        </p:nvPicPr>
-        <p:blipFill>
-          <a:blip r:embed="rId2">
-            <a:extLst>
-              <a:ext uri="{28A0092B-C50C-407E-A947-70E740481C1C}">
-                <a14:useLocalDpi xmlns:a14="http://schemas.microsoft.com/office/drawing/2010/main" val="0"/>
-              </a:ext>
-            </a:extLst>
-          </a:blip>
-          <a:stretch>
-            <a:fillRect/>
-          </a:stretch>
-        </p:blipFill>
-        <p:spPr>
-          <a:xfrm>
-            <a:off x="1384012" y="643466"/>
-            <a:ext cx="5566833" cy="5566833"/>
-          </a:xfrm>
-          <a:prstGeom prst="rect">
-            <a:avLst/>
-          </a:prstGeom>
-        </p:spPr>
-      </p:pic>
       <p:grpSp>
         <p:nvGrpSpPr>
           <p:cNvPr id="50" name="Group 43">
@@ -6718,6 +6682,42 @@
           </p:txBody>
         </p:sp>
       </p:grpSp>
+      <p:pic>
+        <p:nvPicPr>
+          <p:cNvPr id="3" name="Рисунок 2" descr="Изображение выглядит как снимок экрана, шаблон, круг, Графика&#10;&#10;Автоматически созданное описание">
+            <a:extLst>
+              <a:ext uri="{FF2B5EF4-FFF2-40B4-BE49-F238E27FC236}">
+                <a16:creationId xmlns:a16="http://schemas.microsoft.com/office/drawing/2014/main" id="{EDA4C629-0917-3B89-A526-AFAAA7D9DA73}"/>
+              </a:ext>
+            </a:extLst>
+          </p:cNvPr>
+          <p:cNvPicPr>
+            <a:picLocks noChangeAspect="1"/>
+          </p:cNvPicPr>
+          <p:nvPr/>
+        </p:nvPicPr>
+        <p:blipFill>
+          <a:blip r:embed="rId2">
+            <a:extLst>
+              <a:ext uri="{28A0092B-C50C-407E-A947-70E740481C1C}">
+                <a14:useLocalDpi xmlns:a14="http://schemas.microsoft.com/office/drawing/2010/main" val="0"/>
+              </a:ext>
+            </a:extLst>
+          </a:blip>
+          <a:stretch>
+            <a:fillRect/>
+          </a:stretch>
+        </p:blipFill>
+        <p:spPr>
+          <a:xfrm>
+            <a:off x="1469172" y="729250"/>
+            <a:ext cx="5399499" cy="5399499"/>
+          </a:xfrm>
+          <a:prstGeom prst="rect">
+            <a:avLst/>
+          </a:prstGeom>
+        </p:spPr>
+      </p:pic>
     </p:spTree>
     <p:extLst>
       <p:ext uri="{BB962C8B-B14F-4D97-AF65-F5344CB8AC3E}">
@@ -9282,116 +9282,15 @@
           <a:prstGeom prst="ellipse">
             <a:avLst/>
           </a:prstGeom>
-          <a:solidFill>
-            <a:srgbClr val="07FA08"/>
-          </a:solidFill>
-          <a:ln>
-            <a:noFill/>
-          </a:ln>
-        </p:spPr>
-        <p:style>
-          <a:lnRef idx="2">
-            <a:schemeClr val="accent1">
-              <a:shade val="15000"/>
-            </a:schemeClr>
-          </a:lnRef>
-          <a:fillRef idx="1">
-            <a:schemeClr val="accent1"/>
-          </a:fillRef>
-          <a:effectRef idx="0">
-            <a:schemeClr val="accent1"/>
-          </a:effectRef>
-          <a:fontRef idx="minor">
-            <a:schemeClr val="lt1"/>
-          </a:fontRef>
-        </p:style>
-        <p:txBody>
-          <a:bodyPr rtlCol="0" anchor="ctr"/>
-          <a:lstStyle/>
-          <a:p>
-            <a:pPr algn="ctr"/>
-            <a:endParaRPr lang="ru-RU">
-              <a:solidFill>
-                <a:srgbClr val="07FA08"/>
-              </a:solidFill>
-            </a:endParaRPr>
-          </a:p>
-        </p:txBody>
-      </p:sp>
-      <p:sp>
-        <p:nvSpPr>
-          <p:cNvPr id="7" name="Овал 6">
-            <a:extLst>
-              <a:ext uri="{FF2B5EF4-FFF2-40B4-BE49-F238E27FC236}">
-                <a16:creationId xmlns:a16="http://schemas.microsoft.com/office/drawing/2014/main" id="{B24217D2-C36B-D638-4578-ACBDDA6F4B23}"/>
-              </a:ext>
-            </a:extLst>
-          </p:cNvPr>
-          <p:cNvSpPr/>
-          <p:nvPr/>
-        </p:nvSpPr>
-        <p:spPr>
-          <a:xfrm>
-            <a:off x="6239957" y="3757659"/>
-            <a:ext cx="2520000" cy="2520000"/>
-          </a:xfrm>
-          <a:prstGeom prst="ellipse">
-            <a:avLst/>
-          </a:prstGeom>
-          <a:solidFill>
-            <a:srgbClr val="07FA08"/>
-          </a:solidFill>
-          <a:ln>
-            <a:noFill/>
-          </a:ln>
-        </p:spPr>
-        <p:style>
-          <a:lnRef idx="2">
-            <a:schemeClr val="accent1">
-              <a:shade val="15000"/>
-            </a:schemeClr>
-          </a:lnRef>
-          <a:fillRef idx="1">
-            <a:schemeClr val="accent1"/>
-          </a:fillRef>
-          <a:effectRef idx="0">
-            <a:schemeClr val="accent1"/>
-          </a:effectRef>
-          <a:fontRef idx="minor">
-            <a:schemeClr val="lt1"/>
-          </a:fontRef>
-        </p:style>
-        <p:txBody>
-          <a:bodyPr rtlCol="0" anchor="ctr"/>
-          <a:lstStyle/>
-          <a:p>
-            <a:pPr algn="ctr"/>
-            <a:endParaRPr lang="ru-RU"/>
-          </a:p>
-        </p:txBody>
-      </p:sp>
-      <p:sp>
-        <p:nvSpPr>
-          <p:cNvPr id="8" name="Овал 7">
-            <a:extLst>
-              <a:ext uri="{FF2B5EF4-FFF2-40B4-BE49-F238E27FC236}">
-                <a16:creationId xmlns:a16="http://schemas.microsoft.com/office/drawing/2014/main" id="{473267D8-CB44-8953-82B0-472E37BB4B80}"/>
-              </a:ext>
-            </a:extLst>
-          </p:cNvPr>
-          <p:cNvSpPr/>
-          <p:nvPr/>
-        </p:nvSpPr>
-        <p:spPr>
-          <a:xfrm>
-            <a:off x="604251" y="3757659"/>
-            <a:ext cx="2520000" cy="2520000"/>
-          </a:xfrm>
-          <a:prstGeom prst="ellipse">
-            <a:avLst/>
-          </a:prstGeom>
-          <a:blipFill>
-            <a:blip r:embed="rId3"/>
+          <a:blipFill dpi="0" rotWithShape="1">
+            <a:blip r:embed="rId3">
+              <a:extLst>
+                <a:ext uri="{28A0092B-C50C-407E-A947-70E740481C1C}">
+                  <a14:useLocalDpi xmlns:a14="http://schemas.microsoft.com/office/drawing/2010/main" val="0"/>
+                </a:ext>
+              </a:extLst>
+            </a:blip>
+            <a:srcRect/>
             <a:stretch>
               <a:fillRect/>
             </a:stretch>
@@ -9421,6 +9320,127 @@
           <a:lstStyle/>
           <a:p>
             <a:pPr algn="ctr"/>
+            <a:endParaRPr lang="ru-RU">
+              <a:solidFill>
+                <a:srgbClr val="07FA08"/>
+              </a:solidFill>
+            </a:endParaRPr>
+          </a:p>
+        </p:txBody>
+      </p:sp>
+      <p:sp>
+        <p:nvSpPr>
+          <p:cNvPr id="7" name="Овал 6">
+            <a:extLst>
+              <a:ext uri="{FF2B5EF4-FFF2-40B4-BE49-F238E27FC236}">
+                <a16:creationId xmlns:a16="http://schemas.microsoft.com/office/drawing/2014/main" id="{B24217D2-C36B-D638-4578-ACBDDA6F4B23}"/>
+              </a:ext>
+            </a:extLst>
+          </p:cNvPr>
+          <p:cNvSpPr/>
+          <p:nvPr/>
+        </p:nvSpPr>
+        <p:spPr>
+          <a:xfrm>
+            <a:off x="6239957" y="3757659"/>
+            <a:ext cx="2520000" cy="2520000"/>
+          </a:xfrm>
+          <a:prstGeom prst="ellipse">
+            <a:avLst/>
+          </a:prstGeom>
+          <a:blipFill dpi="0" rotWithShape="1">
+            <a:blip r:embed="rId4">
+              <a:extLst>
+                <a:ext uri="{28A0092B-C50C-407E-A947-70E740481C1C}">
+                  <a14:useLocalDpi xmlns:a14="http://schemas.microsoft.com/office/drawing/2010/main" val="0"/>
+                </a:ext>
+              </a:extLst>
+            </a:blip>
+            <a:srcRect/>
+            <a:stretch>
+              <a:fillRect/>
+            </a:stretch>
+          </a:blipFill>
+          <a:ln>
+            <a:noFill/>
+          </a:ln>
+        </p:spPr>
+        <p:style>
+          <a:lnRef idx="2">
+            <a:schemeClr val="accent1">
+              <a:shade val="15000"/>
+            </a:schemeClr>
+          </a:lnRef>
+          <a:fillRef idx="1">
+            <a:schemeClr val="accent1"/>
+          </a:fillRef>
+          <a:effectRef idx="0">
+            <a:schemeClr val="accent1"/>
+          </a:effectRef>
+          <a:fontRef idx="minor">
+            <a:schemeClr val="lt1"/>
+          </a:fontRef>
+        </p:style>
+        <p:txBody>
+          <a:bodyPr rtlCol="0" anchor="ctr"/>
+          <a:lstStyle/>
+          <a:p>
+            <a:pPr algn="ctr"/>
+            <a:endParaRPr lang="ru-RU"/>
+          </a:p>
+        </p:txBody>
+      </p:sp>
+      <p:sp>
+        <p:nvSpPr>
+          <p:cNvPr id="8" name="Овал 7">
+            <a:extLst>
+              <a:ext uri="{FF2B5EF4-FFF2-40B4-BE49-F238E27FC236}">
+                <a16:creationId xmlns:a16="http://schemas.microsoft.com/office/drawing/2014/main" id="{473267D8-CB44-8953-82B0-472E37BB4B80}"/>
+              </a:ext>
+            </a:extLst>
+          </p:cNvPr>
+          <p:cNvSpPr/>
+          <p:nvPr/>
+        </p:nvSpPr>
+        <p:spPr>
+          <a:xfrm>
+            <a:off x="604251" y="3757659"/>
+            <a:ext cx="2520000" cy="2520000"/>
+          </a:xfrm>
+          <a:prstGeom prst="ellipse">
+            <a:avLst/>
+          </a:prstGeom>
+          <a:blipFill>
+            <a:blip r:embed="rId5"/>
+            <a:stretch>
+              <a:fillRect/>
+            </a:stretch>
+          </a:blipFill>
+          <a:ln>
+            <a:noFill/>
+          </a:ln>
+        </p:spPr>
+        <p:style>
+          <a:lnRef idx="2">
+            <a:schemeClr val="accent1">
+              <a:shade val="15000"/>
+            </a:schemeClr>
+          </a:lnRef>
+          <a:fillRef idx="1">
+            <a:schemeClr val="accent1"/>
+          </a:fillRef>
+          <a:effectRef idx="0">
+            <a:schemeClr val="accent1"/>
+          </a:effectRef>
+          <a:fontRef idx="minor">
+            <a:schemeClr val="lt1"/>
+          </a:fontRef>
+        </p:style>
+        <p:txBody>
+          <a:bodyPr rtlCol="0" anchor="ctr"/>
+          <a:lstStyle/>
+          <a:p>
+            <a:pPr algn="ctr"/>
             <a:endParaRPr lang="ru-RU"/>
           </a:p>
         </p:txBody>
@@ -9455,7 +9475,7 @@
           <a:p>
             <a:r>
               <a:rPr lang="ru-RU" sz="2000" dirty="0">
-                <a:hlinkClick r:id="rId4">
+                <a:hlinkClick r:id="rId6">
                   <a:extLst>
                     <a:ext uri="{A12FA001-AC4F-418D-AE19-62706E023703}">
                       <ahyp:hlinkClr xmlns:ahyp="http://schemas.microsoft.com/office/drawing/2018/hyperlinkcolor" val="tx"/>
@@ -9514,7 +9534,7 @@
           <a:p>
             <a:r>
               <a:rPr lang="ru-RU" sz="2000" dirty="0">
-                <a:hlinkClick r:id="rId5">
+                <a:hlinkClick r:id="rId7">
                   <a:extLst>
                     <a:ext uri="{A12FA001-AC4F-418D-AE19-62706E023703}">
                       <ahyp:hlinkClr xmlns:ahyp="http://schemas.microsoft.com/office/drawing/2018/hyperlinkcolor" val="tx"/>
@@ -9564,7 +9584,7 @@
           <a:p>
             <a:r>
               <a:rPr lang="ru-RU" sz="2000" dirty="0">
-                <a:hlinkClick r:id="rId6">
+                <a:hlinkClick r:id="rId8">
                   <a:extLst>
                     <a:ext uri="{A12FA001-AC4F-418D-AE19-62706E023703}">
                       <ahyp:hlinkClr xmlns:ahyp="http://schemas.microsoft.com/office/drawing/2018/hyperlinkcolor" val="tx"/>
@@ -9600,13 +9620,13 @@
           <p:nvPr/>
         </p:nvPicPr>
         <p:blipFill>
-          <a:blip r:embed="rId7">
+          <a:blip r:embed="rId9">
             <a:extLst>
               <a:ext uri="{28A0092B-C50C-407E-A947-70E740481C1C}">
                 <a14:useLocalDpi xmlns:a14="http://schemas.microsoft.com/office/drawing/2010/main" val="0"/>
               </a:ext>
               <a:ext uri="{96DAC541-7B7A-43D3-8B79-37D633B846F1}">
-                <asvg:svgBlip xmlns:asvg="http://schemas.microsoft.com/office/drawing/2016/SVG/main" r:embed="rId8"/>
+                <asvg:svgBlip xmlns:asvg="http://schemas.microsoft.com/office/drawing/2016/SVG/main" r:embed="rId10"/>
               </a:ext>
             </a:extLst>
           </a:blip>
@@ -9639,13 +9659,13 @@
           <p:nvPr/>
         </p:nvPicPr>
         <p:blipFill>
-          <a:blip r:embed="rId9">
+          <a:blip r:embed="rId11">
             <a:extLst>
               <a:ext uri="{28A0092B-C50C-407E-A947-70E740481C1C}">
                 <a14:useLocalDpi xmlns:a14="http://schemas.microsoft.com/office/drawing/2010/main" val="0"/>
               </a:ext>
               <a:ext uri="{96DAC541-7B7A-43D3-8B79-37D633B846F1}">
-                <asvg:svgBlip xmlns:asvg="http://schemas.microsoft.com/office/drawing/2016/SVG/main" r:embed="rId10"/>
+                <asvg:svgBlip xmlns:asvg="http://schemas.microsoft.com/office/drawing/2016/SVG/main" r:embed="rId12"/>
               </a:ext>
             </a:extLst>
           </a:blip>
@@ -9678,13 +9698,13 @@
           <p:nvPr/>
         </p:nvPicPr>
         <p:blipFill>
-          <a:blip r:embed="rId11">
+          <a:blip r:embed="rId13">
             <a:extLst>
               <a:ext uri="{28A0092B-C50C-407E-A947-70E740481C1C}">
                 <a14:useLocalDpi xmlns:a14="http://schemas.microsoft.com/office/drawing/2010/main" val="0"/>
               </a:ext>
               <a:ext uri="{96DAC541-7B7A-43D3-8B79-37D633B846F1}">
-                <asvg:svgBlip xmlns:asvg="http://schemas.microsoft.com/office/drawing/2016/SVG/main" r:embed="rId12"/>
+                <asvg:svgBlip xmlns:asvg="http://schemas.microsoft.com/office/drawing/2016/SVG/main" r:embed="rId14"/>
               </a:ext>
             </a:extLst>
           </a:blip>
@@ -9732,7 +9752,7 @@
           <a:p>
             <a:r>
               <a:rPr lang="ru-RU" sz="2000" dirty="0">
-                <a:hlinkClick r:id="rId13">
+                <a:hlinkClick r:id="rId15">
                   <a:extLst>
                     <a:ext uri="{A12FA001-AC4F-418D-AE19-62706E023703}">
                       <ahyp:hlinkClr xmlns:ahyp="http://schemas.microsoft.com/office/drawing/2018/hyperlinkcolor" val="tx"/>
@@ -9768,7 +9788,7 @@
           <p:nvPr/>
         </p:nvPicPr>
         <p:blipFill rotWithShape="1">
-          <a:blip r:embed="rId14">
+          <a:blip r:embed="rId16">
             <a:extLst>
               <a:ext uri="{28A0092B-C50C-407E-A947-70E740481C1C}">
                 <a14:useLocalDpi xmlns:a14="http://schemas.microsoft.com/office/drawing/2010/main" val="0"/>

</xml_diff>